<commit_message>
NewFeatures folder added with varCapability for PVSystem2
git-svn-id: https://svn.code.sf.net/p/electricdss/code@2689 d8739450-1e93-4ef4-a0af-c327d92816ff
</commit_message>
<xml_diff>
--- a/trunk/Version8/Distrib/Examples/InverterModels/PVSystem2/ModelValidation/PVSystem_PVSystem2-Comparison.pptx
+++ b/trunk/Version8/Distrib/Examples/InverterModels/PVSystem2/ModelValidation/PVSystem_PVSystem2-Comparison.pptx
@@ -3453,6 +3453,41 @@
           </a:p>
         </p:txBody>
       </p:sp>
+      <p:sp>
+        <p:nvSpPr>
+          <p:cNvPr id="4" name="TextBox 3">
+            <a:extLst>
+              <a:ext uri="{FF2B5EF4-FFF2-40B4-BE49-F238E27FC236}">
+                <a16:creationId xmlns:a16="http://schemas.microsoft.com/office/drawing/2014/main" id="{CB759E9F-B308-419F-B09F-873258BF9457}"/>
+              </a:ext>
+            </a:extLst>
+          </p:cNvPr>
+          <p:cNvSpPr txBox="1"/>
+          <p:nvPr/>
+        </p:nvSpPr>
+        <p:spPr>
+          <a:xfrm>
+            <a:off x="7130642" y="6042139"/>
+            <a:ext cx="3838167" cy="369332"/>
+          </a:xfrm>
+          <a:prstGeom prst="rect">
+            <a:avLst/>
+          </a:prstGeom>
+          <a:noFill/>
+        </p:spPr>
+        <p:txBody>
+          <a:bodyPr wrap="none" rtlCol="0">
+            <a:spAutoFit/>
+          </a:bodyPr>
+          <a:lstStyle/>
+          <a:p>
+            <a:r>
+              <a:rPr lang="en-US" dirty="0"/>
+              <a:t>Authors: Paulo Radatz and Celso Rocha</a:t>
+            </a:r>
+          </a:p>
+        </p:txBody>
+      </p:sp>
     </p:spTree>
     <p:extLst>
       <p:ext uri="{BB962C8B-B14F-4D97-AF65-F5344CB8AC3E}">

</xml_diff>

<commit_message>
PVSystem2, PVSystem2/ModelValidation, and PVSystem2/NewFeatures updated
git-svn-id: https://svn.code.sf.net/p/electricdss/code@2733 d8739450-1e93-4ef4-a0af-c327d92816ff
</commit_message>
<xml_diff>
--- a/trunk/Version8/Distrib/Examples/InverterModels/PVSystem2/ModelValidation/PVSystem_PVSystem2-Comparison.pptx
+++ b/trunk/Version8/Distrib/Examples/InverterModels/PVSystem2/ModelValidation/PVSystem_PVSystem2-Comparison.pptx
@@ -277,7 +277,7 @@
           <a:p>
             <a:fld id="{367692C9-83A8-4D68-9EFC-A7C1E01B131E}" type="datetimeFigureOut">
               <a:rPr lang="en-US" smtClean="0"/>
-              <a:t>9/3/2019</a:t>
+              <a:t>10/29/2019</a:t>
             </a:fld>
             <a:endParaRPr lang="en-US"/>
           </a:p>
@@ -477,7 +477,7 @@
           <a:p>
             <a:fld id="{367692C9-83A8-4D68-9EFC-A7C1E01B131E}" type="datetimeFigureOut">
               <a:rPr lang="en-US" smtClean="0"/>
-              <a:t>9/3/2019</a:t>
+              <a:t>10/29/2019</a:t>
             </a:fld>
             <a:endParaRPr lang="en-US"/>
           </a:p>
@@ -687,7 +687,7 @@
           <a:p>
             <a:fld id="{367692C9-83A8-4D68-9EFC-A7C1E01B131E}" type="datetimeFigureOut">
               <a:rPr lang="en-US" smtClean="0"/>
-              <a:t>9/3/2019</a:t>
+              <a:t>10/29/2019</a:t>
             </a:fld>
             <a:endParaRPr lang="en-US"/>
           </a:p>
@@ -887,7 +887,7 @@
           <a:p>
             <a:fld id="{367692C9-83A8-4D68-9EFC-A7C1E01B131E}" type="datetimeFigureOut">
               <a:rPr lang="en-US" smtClean="0"/>
-              <a:t>9/3/2019</a:t>
+              <a:t>10/29/2019</a:t>
             </a:fld>
             <a:endParaRPr lang="en-US"/>
           </a:p>
@@ -1163,7 +1163,7 @@
           <a:p>
             <a:fld id="{367692C9-83A8-4D68-9EFC-A7C1E01B131E}" type="datetimeFigureOut">
               <a:rPr lang="en-US" smtClean="0"/>
-              <a:t>9/3/2019</a:t>
+              <a:t>10/29/2019</a:t>
             </a:fld>
             <a:endParaRPr lang="en-US"/>
           </a:p>
@@ -1431,7 +1431,7 @@
           <a:p>
             <a:fld id="{367692C9-83A8-4D68-9EFC-A7C1E01B131E}" type="datetimeFigureOut">
               <a:rPr lang="en-US" smtClean="0"/>
-              <a:t>9/3/2019</a:t>
+              <a:t>10/29/2019</a:t>
             </a:fld>
             <a:endParaRPr lang="en-US"/>
           </a:p>
@@ -1846,7 +1846,7 @@
           <a:p>
             <a:fld id="{367692C9-83A8-4D68-9EFC-A7C1E01B131E}" type="datetimeFigureOut">
               <a:rPr lang="en-US" smtClean="0"/>
-              <a:t>9/3/2019</a:t>
+              <a:t>10/29/2019</a:t>
             </a:fld>
             <a:endParaRPr lang="en-US"/>
           </a:p>
@@ -1988,7 +1988,7 @@
           <a:p>
             <a:fld id="{367692C9-83A8-4D68-9EFC-A7C1E01B131E}" type="datetimeFigureOut">
               <a:rPr lang="en-US" smtClean="0"/>
-              <a:t>9/3/2019</a:t>
+              <a:t>10/29/2019</a:t>
             </a:fld>
             <a:endParaRPr lang="en-US"/>
           </a:p>
@@ -2101,7 +2101,7 @@
           <a:p>
             <a:fld id="{367692C9-83A8-4D68-9EFC-A7C1E01B131E}" type="datetimeFigureOut">
               <a:rPr lang="en-US" smtClean="0"/>
-              <a:t>9/3/2019</a:t>
+              <a:t>10/29/2019</a:t>
             </a:fld>
             <a:endParaRPr lang="en-US"/>
           </a:p>
@@ -2414,7 +2414,7 @@
           <a:p>
             <a:fld id="{367692C9-83A8-4D68-9EFC-A7C1E01B131E}" type="datetimeFigureOut">
               <a:rPr lang="en-US" smtClean="0"/>
-              <a:t>9/3/2019</a:t>
+              <a:t>10/29/2019</a:t>
             </a:fld>
             <a:endParaRPr lang="en-US"/>
           </a:p>
@@ -2703,7 +2703,7 @@
           <a:p>
             <a:fld id="{367692C9-83A8-4D68-9EFC-A7C1E01B131E}" type="datetimeFigureOut">
               <a:rPr lang="en-US" smtClean="0"/>
-              <a:t>9/3/2019</a:t>
+              <a:t>10/29/2019</a:t>
             </a:fld>
             <a:endParaRPr lang="en-US"/>
           </a:p>
@@ -2946,7 +2946,7 @@
           <a:p>
             <a:fld id="{367692C9-83A8-4D68-9EFC-A7C1E01B131E}" type="datetimeFigureOut">
               <a:rPr lang="en-US" smtClean="0"/>
-              <a:t>9/3/2019</a:t>
+              <a:t>10/29/2019</a:t>
             </a:fld>
             <a:endParaRPr lang="en-US"/>
           </a:p>
@@ -4308,10 +4308,10 @@
       </p:pic>
       <p:pic>
         <p:nvPicPr>
-          <p:cNvPr id="14" name="Picture 13">
-            <a:extLst>
-              <a:ext uri="{FF2B5EF4-FFF2-40B4-BE49-F238E27FC236}">
-                <a16:creationId xmlns:a16="http://schemas.microsoft.com/office/drawing/2014/main" id="{4A72D9FB-905C-47EF-AF83-A59DC0E65481}"/>
+          <p:cNvPr id="15" name="Picture 14">
+            <a:extLst>
+              <a:ext uri="{FF2B5EF4-FFF2-40B4-BE49-F238E27FC236}">
+                <a16:creationId xmlns:a16="http://schemas.microsoft.com/office/drawing/2014/main" id="{DACF8F35-03FF-4C28-AB47-0753EC5509F9}"/>
               </a:ext>
             </a:extLst>
           </p:cNvPr>
@@ -4328,8 +4328,8 @@
         </p:blipFill>
         <p:spPr>
           <a:xfrm>
-            <a:off x="191641" y="4406162"/>
-            <a:ext cx="4205145" cy="1991310"/>
+            <a:off x="6442174" y="3355375"/>
+            <a:ext cx="4582644" cy="1639717"/>
           </a:xfrm>
           <a:prstGeom prst="rect">
             <a:avLst/>
@@ -4348,10 +4348,10 @@
       </p:pic>
       <p:pic>
         <p:nvPicPr>
-          <p:cNvPr id="15" name="Picture 14">
-            <a:extLst>
-              <a:ext uri="{FF2B5EF4-FFF2-40B4-BE49-F238E27FC236}">
-                <a16:creationId xmlns:a16="http://schemas.microsoft.com/office/drawing/2014/main" id="{DACF8F35-03FF-4C28-AB47-0753EC5509F9}"/>
+          <p:cNvPr id="2" name="Picture 1">
+            <a:extLst>
+              <a:ext uri="{FF2B5EF4-FFF2-40B4-BE49-F238E27FC236}">
+                <a16:creationId xmlns:a16="http://schemas.microsoft.com/office/drawing/2014/main" id="{65E370CC-59A6-4FF7-9B3B-514410081DFF}"/>
               </a:ext>
             </a:extLst>
           </p:cNvPr>
@@ -4368,8 +4368,8 @@
         </p:blipFill>
         <p:spPr>
           <a:xfrm>
-            <a:off x="6442174" y="3355375"/>
-            <a:ext cx="4582644" cy="1639717"/>
+            <a:off x="294114" y="4222916"/>
+            <a:ext cx="4589956" cy="2162185"/>
           </a:xfrm>
           <a:prstGeom prst="rect">
             <a:avLst/>
@@ -4416,243 +4416,12 @@
           <a:chExt cx="0" cy="0"/>
         </a:xfrm>
       </p:grpSpPr>
-      <p:sp>
-        <p:nvSpPr>
-          <p:cNvPr id="4" name="Título 3">
-            <a:extLst>
-              <a:ext uri="{FF2B5EF4-FFF2-40B4-BE49-F238E27FC236}">
-                <a16:creationId xmlns:a16="http://schemas.microsoft.com/office/drawing/2014/main" id="{CD7B3784-DFD6-4595-8C69-E62D85A7B673}"/>
-              </a:ext>
-            </a:extLst>
-          </p:cNvPr>
-          <p:cNvSpPr>
-            <a:spLocks noGrp="1"/>
-          </p:cNvSpPr>
-          <p:nvPr>
-            <p:ph type="title"/>
-          </p:nvPr>
-        </p:nvSpPr>
-        <p:spPr>
-          <a:xfrm>
-            <a:off x="0" y="0"/>
-            <a:ext cx="10515600" cy="452761"/>
-          </a:xfrm>
-        </p:spPr>
-        <p:txBody>
-          <a:bodyPr>
-            <a:normAutofit fontScale="90000"/>
-          </a:bodyPr>
-          <a:lstStyle/>
-          <a:p>
-            <a:r>
-              <a:rPr lang="en-US" sz="3200" dirty="0"/>
-              <a:t>Scenario 8: Snapshot with pf=0.9 and kVA limitation (watt priority) </a:t>
-            </a:r>
-          </a:p>
-        </p:txBody>
-      </p:sp>
-      <p:sp>
-        <p:nvSpPr>
-          <p:cNvPr id="5" name="Espaço Reservado para Conteúdo 4">
-            <a:extLst>
-              <a:ext uri="{FF2B5EF4-FFF2-40B4-BE49-F238E27FC236}">
-                <a16:creationId xmlns:a16="http://schemas.microsoft.com/office/drawing/2014/main" id="{2AE307A2-D210-40E2-B69B-451DDDB15EE9}"/>
-              </a:ext>
-            </a:extLst>
-          </p:cNvPr>
-          <p:cNvSpPr>
-            <a:spLocks noGrp="1"/>
-          </p:cNvSpPr>
-          <p:nvPr>
-            <p:ph idx="1"/>
-          </p:nvPr>
-        </p:nvSpPr>
-        <p:spPr>
-          <a:xfrm>
-            <a:off x="92476" y="795815"/>
-            <a:ext cx="2526437" cy="1725443"/>
-          </a:xfrm>
-        </p:spPr>
-        <p:txBody>
-          <a:bodyPr>
-            <a:normAutofit/>
-          </a:bodyPr>
-          <a:lstStyle/>
-          <a:p>
-            <a:r>
-              <a:rPr lang="pt-BR" sz="1400" b="1" dirty="0"/>
-              <a:t>k</a:t>
-            </a:r>
-            <a:r>
-              <a:rPr lang="en-US" sz="1400" b="1" dirty="0"/>
-              <a:t>VA = 1010kVA</a:t>
-            </a:r>
-          </a:p>
-          <a:p>
-            <a:r>
-              <a:rPr lang="pt-BR" sz="1400" b="1" dirty="0"/>
-              <a:t>P</a:t>
-            </a:r>
-            <a:r>
-              <a:rPr lang="en-US" sz="1400" b="1" dirty="0" err="1"/>
-              <a:t>fpriority</a:t>
-            </a:r>
-            <a:r>
-              <a:rPr lang="en-US" sz="1400" b="1" dirty="0"/>
-              <a:t>=no</a:t>
-            </a:r>
-          </a:p>
-          <a:p>
-            <a:r>
-              <a:rPr lang="pt-BR" sz="1400" b="1" dirty="0"/>
-              <a:t>W</a:t>
-            </a:r>
-            <a:r>
-              <a:rPr lang="en-US" sz="1400" b="1" dirty="0" err="1"/>
-              <a:t>attpriority</a:t>
-            </a:r>
-            <a:r>
-              <a:rPr lang="en-US" sz="1400" b="1" dirty="0"/>
-              <a:t>=yes</a:t>
-            </a:r>
-          </a:p>
-        </p:txBody>
-      </p:sp>
-      <p:sp>
-        <p:nvSpPr>
-          <p:cNvPr id="8" name="CaixaDeTexto 7">
-            <a:extLst>
-              <a:ext uri="{FF2B5EF4-FFF2-40B4-BE49-F238E27FC236}">
-                <a16:creationId xmlns:a16="http://schemas.microsoft.com/office/drawing/2014/main" id="{714E8D5F-15A1-412D-BFEC-4B43F89F2D3B}"/>
-              </a:ext>
-            </a:extLst>
-          </p:cNvPr>
-          <p:cNvSpPr txBox="1"/>
-          <p:nvPr/>
-        </p:nvSpPr>
-        <p:spPr>
-          <a:xfrm>
-            <a:off x="92476" y="1749379"/>
-            <a:ext cx="5549479" cy="369332"/>
-          </a:xfrm>
-          <a:prstGeom prst="rect">
-            <a:avLst/>
-          </a:prstGeom>
-          <a:noFill/>
-        </p:spPr>
-        <p:txBody>
-          <a:bodyPr wrap="square" rtlCol="0">
-            <a:spAutoFit/>
-          </a:bodyPr>
-          <a:lstStyle/>
-          <a:p>
-            <a:r>
-              <a:rPr lang="pt-BR" dirty="0"/>
-              <a:t>OpenDSS </a:t>
-            </a:r>
-            <a:r>
-              <a:rPr lang="en-US" dirty="0"/>
-              <a:t>code</a:t>
-            </a:r>
-            <a:r>
-              <a:rPr lang="pt-BR" dirty="0"/>
-              <a:t> (SnapShot_wattP_kVAlimitation-PV.dss)</a:t>
-            </a:r>
-            <a:endParaRPr lang="en-US" dirty="0"/>
-          </a:p>
-        </p:txBody>
-      </p:sp>
-      <p:sp>
-        <p:nvSpPr>
-          <p:cNvPr id="9" name="CaixaDeTexto 8">
-            <a:extLst>
-              <a:ext uri="{FF2B5EF4-FFF2-40B4-BE49-F238E27FC236}">
-                <a16:creationId xmlns:a16="http://schemas.microsoft.com/office/drawing/2014/main" id="{D6ED93D9-C0DC-494C-A57A-2D71C904FB1E}"/>
-              </a:ext>
-            </a:extLst>
-          </p:cNvPr>
-          <p:cNvSpPr txBox="1"/>
-          <p:nvPr/>
-        </p:nvSpPr>
-        <p:spPr>
-          <a:xfrm>
-            <a:off x="6333468" y="868316"/>
-            <a:ext cx="5549479" cy="369332"/>
-          </a:xfrm>
-          <a:prstGeom prst="rect">
-            <a:avLst/>
-          </a:prstGeom>
-          <a:noFill/>
-        </p:spPr>
-        <p:txBody>
-          <a:bodyPr wrap="square" rtlCol="0">
-            <a:spAutoFit/>
-          </a:bodyPr>
-          <a:lstStyle/>
-          <a:p>
-            <a:r>
-              <a:rPr lang="en-US" dirty="0"/>
-              <a:t>Results</a:t>
-            </a:r>
-            <a:r>
-              <a:rPr lang="pt-BR" dirty="0"/>
-              <a:t>:</a:t>
-            </a:r>
-            <a:endParaRPr lang="en-US" dirty="0"/>
-          </a:p>
-        </p:txBody>
-      </p:sp>
-      <p:sp>
-        <p:nvSpPr>
-          <p:cNvPr id="11" name="CaixaDeTexto 10">
-            <a:extLst>
-              <a:ext uri="{FF2B5EF4-FFF2-40B4-BE49-F238E27FC236}">
-                <a16:creationId xmlns:a16="http://schemas.microsoft.com/office/drawing/2014/main" id="{42D39F8C-5855-4750-8886-E821E69AD39E}"/>
-              </a:ext>
-            </a:extLst>
-          </p:cNvPr>
-          <p:cNvSpPr txBox="1"/>
-          <p:nvPr/>
-        </p:nvSpPr>
-        <p:spPr>
-          <a:xfrm>
-            <a:off x="6256694" y="5787945"/>
-            <a:ext cx="5549479" cy="646331"/>
-          </a:xfrm>
-          <a:prstGeom prst="rect">
-            <a:avLst/>
-          </a:prstGeom>
-          <a:noFill/>
-        </p:spPr>
-        <p:txBody>
-          <a:bodyPr wrap="square" rtlCol="0">
-            <a:spAutoFit/>
-          </a:bodyPr>
-          <a:lstStyle/>
-          <a:p>
-            <a:r>
-              <a:rPr lang="en-US" dirty="0"/>
-              <a:t>Key points:</a:t>
-            </a:r>
-          </a:p>
-          <a:p>
-            <a:pPr marL="285750" indent="-285750">
-              <a:buFont typeface="Arial" panose="020B0604020202020204" pitchFamily="34" charset="0"/>
-              <a:buChar char="•"/>
-            </a:pPr>
-            <a:r>
-              <a:rPr lang="en-US" dirty="0"/>
-              <a:t>It works as expected!</a:t>
-            </a:r>
-          </a:p>
-        </p:txBody>
-      </p:sp>
       <p:pic>
         <p:nvPicPr>
-          <p:cNvPr id="3" name="Imagem 2">
-            <a:extLst>
-              <a:ext uri="{FF2B5EF4-FFF2-40B4-BE49-F238E27FC236}">
-                <a16:creationId xmlns:a16="http://schemas.microsoft.com/office/drawing/2014/main" id="{0F2F5042-A3CE-45B3-B785-02F31C56F37D}"/>
+          <p:cNvPr id="7" name="Picture 6">
+            <a:extLst>
+              <a:ext uri="{FF2B5EF4-FFF2-40B4-BE49-F238E27FC236}">
+                <a16:creationId xmlns:a16="http://schemas.microsoft.com/office/drawing/2014/main" id="{F540A340-52BB-4826-9D55-398AE78F06EC}"/>
               </a:ext>
             </a:extLst>
           </p:cNvPr>
@@ -4669,8 +4438,8 @@
         </p:blipFill>
         <p:spPr>
           <a:xfrm>
-            <a:off x="6333468" y="1400968"/>
-            <a:ext cx="5305425" cy="1933575"/>
+            <a:off x="146359" y="4574958"/>
+            <a:ext cx="4097314" cy="2052852"/>
           </a:xfrm>
           <a:prstGeom prst="rect">
             <a:avLst/>
@@ -4689,10 +4458,112 @@
       </p:pic>
       <p:sp>
         <p:nvSpPr>
-          <p:cNvPr id="10" name="CaixaDeTexto 7">
-            <a:extLst>
-              <a:ext uri="{FF2B5EF4-FFF2-40B4-BE49-F238E27FC236}">
-                <a16:creationId xmlns:a16="http://schemas.microsoft.com/office/drawing/2014/main" id="{EAF3397C-372D-4DAE-A154-9A9CFAF0E250}"/>
+          <p:cNvPr id="4" name="Título 3">
+            <a:extLst>
+              <a:ext uri="{FF2B5EF4-FFF2-40B4-BE49-F238E27FC236}">
+                <a16:creationId xmlns:a16="http://schemas.microsoft.com/office/drawing/2014/main" id="{CD7B3784-DFD6-4595-8C69-E62D85A7B673}"/>
+              </a:ext>
+            </a:extLst>
+          </p:cNvPr>
+          <p:cNvSpPr>
+            <a:spLocks noGrp="1"/>
+          </p:cNvSpPr>
+          <p:nvPr>
+            <p:ph type="title"/>
+          </p:nvPr>
+        </p:nvSpPr>
+        <p:spPr>
+          <a:xfrm>
+            <a:off x="0" y="0"/>
+            <a:ext cx="10515600" cy="452761"/>
+          </a:xfrm>
+        </p:spPr>
+        <p:txBody>
+          <a:bodyPr>
+            <a:normAutofit fontScale="90000"/>
+          </a:bodyPr>
+          <a:lstStyle/>
+          <a:p>
+            <a:r>
+              <a:rPr lang="en-US" sz="3200" dirty="0"/>
+              <a:t>Scenario 8: Snapshot with pf=0.9 and kVA limitation (watt priority) </a:t>
+            </a:r>
+          </a:p>
+        </p:txBody>
+      </p:sp>
+      <p:sp>
+        <p:nvSpPr>
+          <p:cNvPr id="5" name="Espaço Reservado para Conteúdo 4">
+            <a:extLst>
+              <a:ext uri="{FF2B5EF4-FFF2-40B4-BE49-F238E27FC236}">
+                <a16:creationId xmlns:a16="http://schemas.microsoft.com/office/drawing/2014/main" id="{2AE307A2-D210-40E2-B69B-451DDDB15EE9}"/>
+              </a:ext>
+            </a:extLst>
+          </p:cNvPr>
+          <p:cNvSpPr>
+            <a:spLocks noGrp="1"/>
+          </p:cNvSpPr>
+          <p:nvPr>
+            <p:ph idx="1"/>
+          </p:nvPr>
+        </p:nvSpPr>
+        <p:spPr>
+          <a:xfrm>
+            <a:off x="92476" y="795815"/>
+            <a:ext cx="2526437" cy="1725443"/>
+          </a:xfrm>
+        </p:spPr>
+        <p:txBody>
+          <a:bodyPr>
+            <a:normAutofit/>
+          </a:bodyPr>
+          <a:lstStyle/>
+          <a:p>
+            <a:r>
+              <a:rPr lang="pt-BR" sz="1400" b="1" dirty="0"/>
+              <a:t>k</a:t>
+            </a:r>
+            <a:r>
+              <a:rPr lang="en-US" sz="1400" b="1" dirty="0"/>
+              <a:t>VA = 1010kVA</a:t>
+            </a:r>
+          </a:p>
+          <a:p>
+            <a:r>
+              <a:rPr lang="pt-BR" sz="1400" b="1" dirty="0"/>
+              <a:t>P</a:t>
+            </a:r>
+            <a:r>
+              <a:rPr lang="en-US" sz="1400" b="1" dirty="0" err="1"/>
+              <a:t>fpriority</a:t>
+            </a:r>
+            <a:r>
+              <a:rPr lang="en-US" sz="1400" b="1" dirty="0"/>
+              <a:t>=no</a:t>
+            </a:r>
+          </a:p>
+          <a:p>
+            <a:r>
+              <a:rPr lang="pt-BR" sz="1400" b="1" dirty="0"/>
+              <a:t>W</a:t>
+            </a:r>
+            <a:r>
+              <a:rPr lang="en-US" sz="1400" b="1" dirty="0" err="1"/>
+              <a:t>attpriority</a:t>
+            </a:r>
+            <a:r>
+              <a:rPr lang="en-US" sz="1400" b="1" dirty="0"/>
+              <a:t>=yes</a:t>
+            </a:r>
+          </a:p>
+        </p:txBody>
+      </p:sp>
+      <p:sp>
+        <p:nvSpPr>
+          <p:cNvPr id="8" name="CaixaDeTexto 7">
+            <a:extLst>
+              <a:ext uri="{FF2B5EF4-FFF2-40B4-BE49-F238E27FC236}">
+                <a16:creationId xmlns:a16="http://schemas.microsoft.com/office/drawing/2014/main" id="{714E8D5F-15A1-412D-BFEC-4B43F89F2D3B}"/>
               </a:ext>
             </a:extLst>
           </p:cNvPr>
@@ -4701,7 +4572,7 @@
         </p:nvSpPr>
         <p:spPr>
           <a:xfrm>
-            <a:off x="58710" y="4152077"/>
+            <a:off x="92476" y="1749379"/>
             <a:ext cx="5549479" cy="369332"/>
           </a:xfrm>
           <a:prstGeom prst="rect">
@@ -4725,18 +4596,103 @@
             </a:r>
             <a:r>
               <a:rPr lang="pt-BR" dirty="0"/>
-              <a:t> (SnapShot_wattP_kVAlimitation-PV2.dss)</a:t>
+              <a:t> (SnapShot_wattP_kVAlimitation-PV.dss)</a:t>
             </a:r>
             <a:endParaRPr lang="en-US" dirty="0"/>
+          </a:p>
+        </p:txBody>
+      </p:sp>
+      <p:sp>
+        <p:nvSpPr>
+          <p:cNvPr id="9" name="CaixaDeTexto 8">
+            <a:extLst>
+              <a:ext uri="{FF2B5EF4-FFF2-40B4-BE49-F238E27FC236}">
+                <a16:creationId xmlns:a16="http://schemas.microsoft.com/office/drawing/2014/main" id="{D6ED93D9-C0DC-494C-A57A-2D71C904FB1E}"/>
+              </a:ext>
+            </a:extLst>
+          </p:cNvPr>
+          <p:cNvSpPr txBox="1"/>
+          <p:nvPr/>
+        </p:nvSpPr>
+        <p:spPr>
+          <a:xfrm>
+            <a:off x="6333468" y="868316"/>
+            <a:ext cx="5549479" cy="369332"/>
+          </a:xfrm>
+          <a:prstGeom prst="rect">
+            <a:avLst/>
+          </a:prstGeom>
+          <a:noFill/>
+        </p:spPr>
+        <p:txBody>
+          <a:bodyPr wrap="square" rtlCol="0">
+            <a:spAutoFit/>
+          </a:bodyPr>
+          <a:lstStyle/>
+          <a:p>
+            <a:r>
+              <a:rPr lang="en-US" dirty="0"/>
+              <a:t>Results</a:t>
+            </a:r>
+            <a:r>
+              <a:rPr lang="pt-BR" dirty="0"/>
+              <a:t>:</a:t>
+            </a:r>
+            <a:endParaRPr lang="en-US" dirty="0"/>
+          </a:p>
+        </p:txBody>
+      </p:sp>
+      <p:sp>
+        <p:nvSpPr>
+          <p:cNvPr id="11" name="CaixaDeTexto 10">
+            <a:extLst>
+              <a:ext uri="{FF2B5EF4-FFF2-40B4-BE49-F238E27FC236}">
+                <a16:creationId xmlns:a16="http://schemas.microsoft.com/office/drawing/2014/main" id="{42D39F8C-5855-4750-8886-E821E69AD39E}"/>
+              </a:ext>
+            </a:extLst>
+          </p:cNvPr>
+          <p:cNvSpPr txBox="1"/>
+          <p:nvPr/>
+        </p:nvSpPr>
+        <p:spPr>
+          <a:xfrm>
+            <a:off x="6256694" y="5787945"/>
+            <a:ext cx="5549479" cy="646331"/>
+          </a:xfrm>
+          <a:prstGeom prst="rect">
+            <a:avLst/>
+          </a:prstGeom>
+          <a:noFill/>
+        </p:spPr>
+        <p:txBody>
+          <a:bodyPr wrap="square" rtlCol="0">
+            <a:spAutoFit/>
+          </a:bodyPr>
+          <a:lstStyle/>
+          <a:p>
+            <a:r>
+              <a:rPr lang="en-US" dirty="0"/>
+              <a:t>Key points:</a:t>
+            </a:r>
+          </a:p>
+          <a:p>
+            <a:pPr marL="285750" indent="-285750">
+              <a:buFont typeface="Arial" panose="020B0604020202020204" pitchFamily="34" charset="0"/>
+              <a:buChar char="•"/>
+            </a:pPr>
+            <a:r>
+              <a:rPr lang="en-US" dirty="0"/>
+              <a:t>It works as expected!</a:t>
+            </a:r>
           </a:p>
         </p:txBody>
       </p:sp>
       <p:pic>
         <p:nvPicPr>
-          <p:cNvPr id="2" name="Picture 1">
-            <a:extLst>
-              <a:ext uri="{FF2B5EF4-FFF2-40B4-BE49-F238E27FC236}">
-                <a16:creationId xmlns:a16="http://schemas.microsoft.com/office/drawing/2014/main" id="{13DAEC8F-F965-4B6C-A77C-B057936662A8}"/>
+          <p:cNvPr id="3" name="Imagem 2">
+            <a:extLst>
+              <a:ext uri="{FF2B5EF4-FFF2-40B4-BE49-F238E27FC236}">
+                <a16:creationId xmlns:a16="http://schemas.microsoft.com/office/drawing/2014/main" id="{0F2F5042-A3CE-45B3-B785-02F31C56F37D}"/>
               </a:ext>
             </a:extLst>
           </p:cNvPr>
@@ -4753,8 +4709,8 @@
         </p:blipFill>
         <p:spPr>
           <a:xfrm>
-            <a:off x="320315" y="2141652"/>
-            <a:ext cx="4040882" cy="2006526"/>
+            <a:off x="6333468" y="1400968"/>
+            <a:ext cx="5305425" cy="1933575"/>
           </a:xfrm>
           <a:prstGeom prst="rect">
             <a:avLst/>
@@ -4771,12 +4727,56 @@
           </a:effectLst>
         </p:spPr>
       </p:pic>
+      <p:sp>
+        <p:nvSpPr>
+          <p:cNvPr id="10" name="CaixaDeTexto 7">
+            <a:extLst>
+              <a:ext uri="{FF2B5EF4-FFF2-40B4-BE49-F238E27FC236}">
+                <a16:creationId xmlns:a16="http://schemas.microsoft.com/office/drawing/2014/main" id="{EAF3397C-372D-4DAE-A154-9A9CFAF0E250}"/>
+              </a:ext>
+            </a:extLst>
+          </p:cNvPr>
+          <p:cNvSpPr txBox="1"/>
+          <p:nvPr/>
+        </p:nvSpPr>
+        <p:spPr>
+          <a:xfrm>
+            <a:off x="58710" y="4152077"/>
+            <a:ext cx="5549479" cy="369332"/>
+          </a:xfrm>
+          <a:prstGeom prst="rect">
+            <a:avLst/>
+          </a:prstGeom>
+          <a:noFill/>
+        </p:spPr>
+        <p:txBody>
+          <a:bodyPr wrap="square" rtlCol="0">
+            <a:spAutoFit/>
+          </a:bodyPr>
+          <a:lstStyle/>
+          <a:p>
+            <a:r>
+              <a:rPr lang="pt-BR" dirty="0"/>
+              <a:t>OpenDSS </a:t>
+            </a:r>
+            <a:r>
+              <a:rPr lang="en-US" dirty="0"/>
+              <a:t>code</a:t>
+            </a:r>
+            <a:r>
+              <a:rPr lang="pt-BR" dirty="0"/>
+              <a:t> (SnapShot_wattP_kVAlimitation-PV2.dss)</a:t>
+            </a:r>
+            <a:endParaRPr lang="en-US" dirty="0"/>
+          </a:p>
+        </p:txBody>
+      </p:sp>
       <p:pic>
         <p:nvPicPr>
-          <p:cNvPr id="6" name="Picture 5">
-            <a:extLst>
-              <a:ext uri="{FF2B5EF4-FFF2-40B4-BE49-F238E27FC236}">
-                <a16:creationId xmlns:a16="http://schemas.microsoft.com/office/drawing/2014/main" id="{94F683DD-A3D4-45BC-B937-84639B3EC9DE}"/>
+          <p:cNvPr id="2" name="Picture 1">
+            <a:extLst>
+              <a:ext uri="{FF2B5EF4-FFF2-40B4-BE49-F238E27FC236}">
+                <a16:creationId xmlns:a16="http://schemas.microsoft.com/office/drawing/2014/main" id="{13DAEC8F-F965-4B6C-A77C-B057936662A8}"/>
               </a:ext>
             </a:extLst>
           </p:cNvPr>
@@ -4793,8 +4793,8 @@
         </p:blipFill>
         <p:spPr>
           <a:xfrm>
-            <a:off x="287461" y="4585379"/>
-            <a:ext cx="3901257" cy="1924125"/>
+            <a:off x="320315" y="2141652"/>
+            <a:ext cx="4040882" cy="2006526"/>
           </a:xfrm>
           <a:prstGeom prst="rect">
             <a:avLst/>
@@ -5306,10 +5306,10 @@
       </p:sp>
       <p:pic>
         <p:nvPicPr>
-          <p:cNvPr id="2" name="Picture 1">
-            <a:extLst>
-              <a:ext uri="{FF2B5EF4-FFF2-40B4-BE49-F238E27FC236}">
-                <a16:creationId xmlns:a16="http://schemas.microsoft.com/office/drawing/2014/main" id="{1C6CFB77-60D8-44E8-8AE1-00CA27E9834B}"/>
+          <p:cNvPr id="3" name="Picture 2">
+            <a:extLst>
+              <a:ext uri="{FF2B5EF4-FFF2-40B4-BE49-F238E27FC236}">
+                <a16:creationId xmlns:a16="http://schemas.microsoft.com/office/drawing/2014/main" id="{D140218E-CB48-4441-A0CE-029A679218B7}"/>
               </a:ext>
             </a:extLst>
           </p:cNvPr>
@@ -5326,8 +5326,8 @@
         </p:blipFill>
         <p:spPr>
           <a:xfrm>
-            <a:off x="224493" y="4482912"/>
-            <a:ext cx="4328343" cy="2111387"/>
+            <a:off x="290199" y="2118450"/>
+            <a:ext cx="3949612" cy="1962557"/>
           </a:xfrm>
           <a:prstGeom prst="rect">
             <a:avLst/>
@@ -5346,10 +5346,10 @@
       </p:pic>
       <p:pic>
         <p:nvPicPr>
-          <p:cNvPr id="3" name="Picture 2">
-            <a:extLst>
-              <a:ext uri="{FF2B5EF4-FFF2-40B4-BE49-F238E27FC236}">
-                <a16:creationId xmlns:a16="http://schemas.microsoft.com/office/drawing/2014/main" id="{D140218E-CB48-4441-A0CE-029A679218B7}"/>
+          <p:cNvPr id="13" name="Picture 12">
+            <a:extLst>
+              <a:ext uri="{FF2B5EF4-FFF2-40B4-BE49-F238E27FC236}">
+                <a16:creationId xmlns:a16="http://schemas.microsoft.com/office/drawing/2014/main" id="{59937F2C-5FEB-4A18-B668-68D37FA0A972}"/>
               </a:ext>
             </a:extLst>
           </p:cNvPr>
@@ -5366,8 +5366,8 @@
         </p:blipFill>
         <p:spPr>
           <a:xfrm>
-            <a:off x="290199" y="2118450"/>
-            <a:ext cx="3949612" cy="1962557"/>
+            <a:off x="6241047" y="3359012"/>
+            <a:ext cx="4996404" cy="1858662"/>
           </a:xfrm>
           <a:prstGeom prst="rect">
             <a:avLst/>
@@ -5386,10 +5386,10 @@
       </p:pic>
       <p:pic>
         <p:nvPicPr>
-          <p:cNvPr id="13" name="Picture 12">
-            <a:extLst>
-              <a:ext uri="{FF2B5EF4-FFF2-40B4-BE49-F238E27FC236}">
-                <a16:creationId xmlns:a16="http://schemas.microsoft.com/office/drawing/2014/main" id="{59937F2C-5FEB-4A18-B668-68D37FA0A972}"/>
+          <p:cNvPr id="7" name="Picture 6">
+            <a:extLst>
+              <a:ext uri="{FF2B5EF4-FFF2-40B4-BE49-F238E27FC236}">
+                <a16:creationId xmlns:a16="http://schemas.microsoft.com/office/drawing/2014/main" id="{CFA01581-39FA-44F8-9640-FD993FCCCF86}"/>
               </a:ext>
             </a:extLst>
           </p:cNvPr>
@@ -5406,8 +5406,8 @@
         </p:blipFill>
         <p:spPr>
           <a:xfrm>
-            <a:off x="6241047" y="3359012"/>
-            <a:ext cx="4996404" cy="1858662"/>
+            <a:off x="229112" y="4528885"/>
+            <a:ext cx="4071785" cy="2049686"/>
           </a:xfrm>
           <a:prstGeom prst="rect">
             <a:avLst/>
@@ -7304,10 +7304,10 @@
       </p:grpSpPr>
       <p:pic>
         <p:nvPicPr>
-          <p:cNvPr id="13" name="Picture 12">
-            <a:extLst>
-              <a:ext uri="{FF2B5EF4-FFF2-40B4-BE49-F238E27FC236}">
-                <a16:creationId xmlns:a16="http://schemas.microsoft.com/office/drawing/2014/main" id="{A03ED2E3-D57E-462F-9E97-4DEB75484C84}"/>
+          <p:cNvPr id="2" name="Picture 1">
+            <a:extLst>
+              <a:ext uri="{FF2B5EF4-FFF2-40B4-BE49-F238E27FC236}">
+                <a16:creationId xmlns:a16="http://schemas.microsoft.com/office/drawing/2014/main" id="{25477BEC-57C5-4078-8739-BE6E87DF8B78}"/>
               </a:ext>
             </a:extLst>
           </p:cNvPr>
@@ -7324,8 +7324,8 @@
         </p:blipFill>
         <p:spPr>
           <a:xfrm>
-            <a:off x="54754" y="2783922"/>
-            <a:ext cx="6096000" cy="2675336"/>
+            <a:off x="92476" y="2767369"/>
+            <a:ext cx="6032198" cy="2875578"/>
           </a:xfrm>
           <a:prstGeom prst="rect">
             <a:avLst/>
@@ -7659,6 +7659,86 @@
           </a:effectLst>
         </p:spPr>
       </p:pic>
+      <p:cxnSp>
+        <p:nvCxnSpPr>
+          <p:cNvPr id="12" name="Straight Arrow Connector 11">
+            <a:extLst>
+              <a:ext uri="{FF2B5EF4-FFF2-40B4-BE49-F238E27FC236}">
+                <a16:creationId xmlns:a16="http://schemas.microsoft.com/office/drawing/2014/main" id="{B4A538BF-7BAE-462A-88FC-DF69916683AE}"/>
+              </a:ext>
+            </a:extLst>
+          </p:cNvPr>
+          <p:cNvCxnSpPr>
+            <a:cxnSpLocks/>
+          </p:cNvCxnSpPr>
+          <p:nvPr/>
+        </p:nvCxnSpPr>
+        <p:spPr>
+          <a:xfrm flipH="1" flipV="1">
+            <a:off x="1887667" y="4281590"/>
+            <a:ext cx="3029286" cy="1894718"/>
+          </a:xfrm>
+          <a:prstGeom prst="straightConnector1">
+            <a:avLst/>
+          </a:prstGeom>
+          <a:ln>
+            <a:tailEnd type="triangle"/>
+          </a:ln>
+        </p:spPr>
+        <p:style>
+          <a:lnRef idx="3">
+            <a:schemeClr val="accent2"/>
+          </a:lnRef>
+          <a:fillRef idx="0">
+            <a:schemeClr val="accent2"/>
+          </a:fillRef>
+          <a:effectRef idx="2">
+            <a:schemeClr val="accent2"/>
+          </a:effectRef>
+          <a:fontRef idx="minor">
+            <a:schemeClr val="tx1"/>
+          </a:fontRef>
+        </p:style>
+      </p:cxnSp>
+      <p:sp>
+        <p:nvSpPr>
+          <p:cNvPr id="15" name="CaixaDeTexto 10">
+            <a:extLst>
+              <a:ext uri="{FF2B5EF4-FFF2-40B4-BE49-F238E27FC236}">
+                <a16:creationId xmlns:a16="http://schemas.microsoft.com/office/drawing/2014/main" id="{A9CCD9D7-C2B8-4BE3-8409-E0F4CD2BD430}"/>
+              </a:ext>
+            </a:extLst>
+          </p:cNvPr>
+          <p:cNvSpPr txBox="1"/>
+          <p:nvPr/>
+        </p:nvSpPr>
+        <p:spPr>
+          <a:xfrm>
+            <a:off x="4166899" y="6185443"/>
+            <a:ext cx="5549479" cy="369332"/>
+          </a:xfrm>
+          <a:prstGeom prst="rect">
+            <a:avLst/>
+          </a:prstGeom>
+          <a:noFill/>
+        </p:spPr>
+        <p:txBody>
+          <a:bodyPr wrap="square" rtlCol="0">
+            <a:spAutoFit/>
+          </a:bodyPr>
+          <a:lstStyle/>
+          <a:p>
+            <a:r>
+              <a:rPr lang="en-US" dirty="0">
+                <a:solidFill>
+                  <a:schemeClr val="accent2"/>
+                </a:solidFill>
+              </a:rPr>
+              <a:t>New property name</a:t>
+            </a:r>
+          </a:p>
+        </p:txBody>
+      </p:sp>
     </p:spTree>
     <p:extLst>
       <p:ext uri="{BB962C8B-B14F-4D97-AF65-F5344CB8AC3E}">
@@ -8170,11 +8250,11 @@
             </a:r>
             <a:r>
               <a:rPr lang="en-US" sz="2400" dirty="0"/>
-              <a:t>*</a:t>
+              <a:t>*%</a:t>
             </a:r>
             <a:r>
               <a:rPr lang="en-US" sz="2400" dirty="0" err="1"/>
-              <a:t>pctPmpp</a:t>
+              <a:t>Pmpp</a:t>
             </a:r>
             <a:r>
               <a:rPr lang="en-US" sz="2400" dirty="0"/>
@@ -8389,10 +8469,10 @@
       </p:sp>
       <p:pic>
         <p:nvPicPr>
-          <p:cNvPr id="6" name="Picture 5">
-            <a:extLst>
-              <a:ext uri="{FF2B5EF4-FFF2-40B4-BE49-F238E27FC236}">
-                <a16:creationId xmlns:a16="http://schemas.microsoft.com/office/drawing/2014/main" id="{3C343E83-CDFA-4FC9-A823-82131842A783}"/>
+          <p:cNvPr id="7" name="Picture 6">
+            <a:extLst>
+              <a:ext uri="{FF2B5EF4-FFF2-40B4-BE49-F238E27FC236}">
+                <a16:creationId xmlns:a16="http://schemas.microsoft.com/office/drawing/2014/main" id="{BDE93A64-D981-42CF-A882-FF7B3F199EF8}"/>
               </a:ext>
             </a:extLst>
           </p:cNvPr>
@@ -8409,8 +8489,8 @@
         </p:blipFill>
         <p:spPr>
           <a:xfrm>
-            <a:off x="167001" y="3791748"/>
-            <a:ext cx="5180216" cy="2408100"/>
+            <a:off x="6465620" y="1525565"/>
+            <a:ext cx="4906887" cy="1791508"/>
           </a:xfrm>
           <a:prstGeom prst="rect">
             <a:avLst/>
@@ -8429,10 +8509,10 @@
       </p:pic>
       <p:pic>
         <p:nvPicPr>
-          <p:cNvPr id="7" name="Picture 6">
-            <a:extLst>
-              <a:ext uri="{FF2B5EF4-FFF2-40B4-BE49-F238E27FC236}">
-                <a16:creationId xmlns:a16="http://schemas.microsoft.com/office/drawing/2014/main" id="{BDE93A64-D981-42CF-A882-FF7B3F199EF8}"/>
+          <p:cNvPr id="2" name="Picture 1">
+            <a:extLst>
+              <a:ext uri="{FF2B5EF4-FFF2-40B4-BE49-F238E27FC236}">
+                <a16:creationId xmlns:a16="http://schemas.microsoft.com/office/drawing/2014/main" id="{75DE5D45-C637-4AF0-BB7D-4BC3D57C29F0}"/>
               </a:ext>
             </a:extLst>
           </p:cNvPr>
@@ -8449,8 +8529,8 @@
         </p:blipFill>
         <p:spPr>
           <a:xfrm>
-            <a:off x="6465620" y="1525565"/>
-            <a:ext cx="4906887" cy="1791508"/>
+            <a:off x="302184" y="3896992"/>
+            <a:ext cx="5219673" cy="2507003"/>
           </a:xfrm>
           <a:prstGeom prst="rect">
             <a:avLst/>
@@ -8896,10 +8976,10 @@
       </p:sp>
       <p:pic>
         <p:nvPicPr>
-          <p:cNvPr id="3" name="Picture 2">
-            <a:extLst>
-              <a:ext uri="{FF2B5EF4-FFF2-40B4-BE49-F238E27FC236}">
-                <a16:creationId xmlns:a16="http://schemas.microsoft.com/office/drawing/2014/main" id="{B068925A-B723-49CD-8C30-D50562C4895F}"/>
+          <p:cNvPr id="13" name="Picture 12">
+            <a:extLst>
+              <a:ext uri="{FF2B5EF4-FFF2-40B4-BE49-F238E27FC236}">
+                <a16:creationId xmlns:a16="http://schemas.microsoft.com/office/drawing/2014/main" id="{E00A7C0B-C7D5-4D65-9A80-C705B0F1622B}"/>
               </a:ext>
             </a:extLst>
           </p:cNvPr>
@@ -8916,8 +8996,8 @@
         </p:blipFill>
         <p:spPr>
           <a:xfrm>
-            <a:off x="207874" y="4743570"/>
-            <a:ext cx="4213551" cy="1949087"/>
+            <a:off x="6416129" y="3315798"/>
+            <a:ext cx="4115897" cy="1468403"/>
           </a:xfrm>
           <a:prstGeom prst="rect">
             <a:avLst/>
@@ -8936,10 +9016,10 @@
       </p:pic>
       <p:pic>
         <p:nvPicPr>
-          <p:cNvPr id="13" name="Picture 12">
-            <a:extLst>
-              <a:ext uri="{FF2B5EF4-FFF2-40B4-BE49-F238E27FC236}">
-                <a16:creationId xmlns:a16="http://schemas.microsoft.com/office/drawing/2014/main" id="{E00A7C0B-C7D5-4D65-9A80-C705B0F1622B}"/>
+          <p:cNvPr id="7" name="Picture 6">
+            <a:extLst>
+              <a:ext uri="{FF2B5EF4-FFF2-40B4-BE49-F238E27FC236}">
+                <a16:creationId xmlns:a16="http://schemas.microsoft.com/office/drawing/2014/main" id="{A60007FB-9BF1-4054-9E5C-89E73C65E8EC}"/>
               </a:ext>
             </a:extLst>
           </p:cNvPr>
@@ -8956,8 +9036,8 @@
         </p:blipFill>
         <p:spPr>
           <a:xfrm>
-            <a:off x="6416129" y="3315798"/>
-            <a:ext cx="4115897" cy="1468403"/>
+            <a:off x="207874" y="4792746"/>
+            <a:ext cx="4194193" cy="2035002"/>
           </a:xfrm>
           <a:prstGeom prst="rect">
             <a:avLst/>

</xml_diff>

<commit_message>
add the documentation of watt-var and watt-pf modes of the invcontrol2. Only tested for PVSystem2
git-svn-id: https://svn.code.sf.net/p/electricdss/code@2839 d8739450-1e93-4ef4-a0af-c327d92816ff
</commit_message>
<xml_diff>
--- a/trunk/Version8/Distrib/Examples/InverterModels/PVSystem2/ModelValidation/PVSystem_PVSystem2-Comparison.pptx
+++ b/trunk/Version8/Distrib/Examples/InverterModels/PVSystem2/ModelValidation/PVSystem_PVSystem2-Comparison.pptx
@@ -277,7 +277,7 @@
           <a:p>
             <a:fld id="{367692C9-83A8-4D68-9EFC-A7C1E01B131E}" type="datetimeFigureOut">
               <a:rPr lang="en-US" smtClean="0"/>
-              <a:t>10/29/2019</a:t>
+              <a:t>1/16/2020</a:t>
             </a:fld>
             <a:endParaRPr lang="en-US"/>
           </a:p>
@@ -477,7 +477,7 @@
           <a:p>
             <a:fld id="{367692C9-83A8-4D68-9EFC-A7C1E01B131E}" type="datetimeFigureOut">
               <a:rPr lang="en-US" smtClean="0"/>
-              <a:t>10/29/2019</a:t>
+              <a:t>1/16/2020</a:t>
             </a:fld>
             <a:endParaRPr lang="en-US"/>
           </a:p>
@@ -687,7 +687,7 @@
           <a:p>
             <a:fld id="{367692C9-83A8-4D68-9EFC-A7C1E01B131E}" type="datetimeFigureOut">
               <a:rPr lang="en-US" smtClean="0"/>
-              <a:t>10/29/2019</a:t>
+              <a:t>1/16/2020</a:t>
             </a:fld>
             <a:endParaRPr lang="en-US"/>
           </a:p>
@@ -887,7 +887,7 @@
           <a:p>
             <a:fld id="{367692C9-83A8-4D68-9EFC-A7C1E01B131E}" type="datetimeFigureOut">
               <a:rPr lang="en-US" smtClean="0"/>
-              <a:t>10/29/2019</a:t>
+              <a:t>1/16/2020</a:t>
             </a:fld>
             <a:endParaRPr lang="en-US"/>
           </a:p>
@@ -1163,7 +1163,7 @@
           <a:p>
             <a:fld id="{367692C9-83A8-4D68-9EFC-A7C1E01B131E}" type="datetimeFigureOut">
               <a:rPr lang="en-US" smtClean="0"/>
-              <a:t>10/29/2019</a:t>
+              <a:t>1/16/2020</a:t>
             </a:fld>
             <a:endParaRPr lang="en-US"/>
           </a:p>
@@ -1431,7 +1431,7 @@
           <a:p>
             <a:fld id="{367692C9-83A8-4D68-9EFC-A7C1E01B131E}" type="datetimeFigureOut">
               <a:rPr lang="en-US" smtClean="0"/>
-              <a:t>10/29/2019</a:t>
+              <a:t>1/16/2020</a:t>
             </a:fld>
             <a:endParaRPr lang="en-US"/>
           </a:p>
@@ -1846,7 +1846,7 @@
           <a:p>
             <a:fld id="{367692C9-83A8-4D68-9EFC-A7C1E01B131E}" type="datetimeFigureOut">
               <a:rPr lang="en-US" smtClean="0"/>
-              <a:t>10/29/2019</a:t>
+              <a:t>1/16/2020</a:t>
             </a:fld>
             <a:endParaRPr lang="en-US"/>
           </a:p>
@@ -1988,7 +1988,7 @@
           <a:p>
             <a:fld id="{367692C9-83A8-4D68-9EFC-A7C1E01B131E}" type="datetimeFigureOut">
               <a:rPr lang="en-US" smtClean="0"/>
-              <a:t>10/29/2019</a:t>
+              <a:t>1/16/2020</a:t>
             </a:fld>
             <a:endParaRPr lang="en-US"/>
           </a:p>
@@ -2101,7 +2101,7 @@
           <a:p>
             <a:fld id="{367692C9-83A8-4D68-9EFC-A7C1E01B131E}" type="datetimeFigureOut">
               <a:rPr lang="en-US" smtClean="0"/>
-              <a:t>10/29/2019</a:t>
+              <a:t>1/16/2020</a:t>
             </a:fld>
             <a:endParaRPr lang="en-US"/>
           </a:p>
@@ -2414,7 +2414,7 @@
           <a:p>
             <a:fld id="{367692C9-83A8-4D68-9EFC-A7C1E01B131E}" type="datetimeFigureOut">
               <a:rPr lang="en-US" smtClean="0"/>
-              <a:t>10/29/2019</a:t>
+              <a:t>1/16/2020</a:t>
             </a:fld>
             <a:endParaRPr lang="en-US"/>
           </a:p>
@@ -2703,7 +2703,7 @@
           <a:p>
             <a:fld id="{367692C9-83A8-4D68-9EFC-A7C1E01B131E}" type="datetimeFigureOut">
               <a:rPr lang="en-US" smtClean="0"/>
-              <a:t>10/29/2019</a:t>
+              <a:t>1/16/2020</a:t>
             </a:fld>
             <a:endParaRPr lang="en-US"/>
           </a:p>
@@ -2946,7 +2946,7 @@
           <a:p>
             <a:fld id="{367692C9-83A8-4D68-9EFC-A7C1E01B131E}" type="datetimeFigureOut">
               <a:rPr lang="en-US" smtClean="0"/>
-              <a:t>10/29/2019</a:t>
+              <a:t>1/16/2020</a:t>
             </a:fld>
             <a:endParaRPr lang="en-US"/>
           </a:p>
@@ -6386,7 +6386,15 @@
           <a:p>
             <a:r>
               <a:rPr lang="en-US" sz="3200" dirty="0"/>
-              <a:t>Scenario 12: Daily with pf=0.9 and kVA limitation (watt priority) </a:t>
+              <a:t>Scenario 12: Daily with pf=0.9 and kVA limitation </a:t>
+            </a:r>
+            <a:r>
+              <a:rPr lang="en-US" sz="3200"/>
+              <a:t>(var </a:t>
+            </a:r>
+            <a:r>
+              <a:rPr lang="en-US" sz="3200" dirty="0"/>
+              <a:t>priority) </a:t>
             </a:r>
           </a:p>
         </p:txBody>

</xml_diff>